<commit_message>
add rag with neo4, chunking methods
</commit_message>
<xml_diff>
--- a/proposal_presentation_yannis.pptx
+++ b/proposal_presentation_yannis.pptx
@@ -286,7 +286,7 @@
       </p15:sldGuideLst>
     </p:ext>
     <p:ext uri="GoogleSlidesCustomDataVersion2">
-      <go:slidesCustomData xmlns="" xmlns:mc="http://schemas.openxmlformats.org/markup-compatibility/2006" xmlns:mv="urn:schemas-microsoft-com:mac:vml" xmlns:c="http://schemas.openxmlformats.org/drawingml/2006/chart" xmlns:dgm="http://schemas.openxmlformats.org/drawingml/2006/diagram" xmlns:o="urn:schemas-microsoft-com:office:office" xmlns:v="urn:schemas-microsoft-com:vml" xmlns:pvml="urn:schemas-microsoft-com:office:powerpoint" xmlns:com="http://schemas.openxmlformats.org/drawingml/2006/compatibility" xmlns:p14="http://schemas.microsoft.com/office/powerpoint/2010/main" xmlns:p15="http://schemas.microsoft.com/office/powerpoint/2012/main" xmlns:ahyp="http://schemas.microsoft.com/office/drawing/2018/hyperlinkcolor" xmlns:go="http://customooxmlschemas.google.com/" r:id="rId22" roundtripDataSignature="AMtx7mjhgS37igSN49LgVE4JAvrMNZCFew=="/>
+      <go:slidesCustomData xmlns:go="http://customooxmlschemas.google.com/" xmlns:ahyp="http://schemas.microsoft.com/office/drawing/2018/hyperlinkcolor" xmlns:p15="http://schemas.microsoft.com/office/powerpoint/2012/main" xmlns:p14="http://schemas.microsoft.com/office/powerpoint/2010/main" xmlns:com="http://schemas.openxmlformats.org/drawingml/2006/compatibility" xmlns:pvml="urn:schemas-microsoft-com:office:powerpoint" xmlns:v="urn:schemas-microsoft-com:vml" xmlns:o="urn:schemas-microsoft-com:office:office" xmlns:dgm="http://schemas.openxmlformats.org/drawingml/2006/diagram" xmlns:c="http://schemas.openxmlformats.org/drawingml/2006/chart" xmlns:mv="urn:schemas-microsoft-com:mac:vml" xmlns:mc="http://schemas.openxmlformats.org/markup-compatibility/2006" xmlns="" r:id="rId22" roundtripDataSignature="AMtx7mjhgS37igSN49LgVE4JAvrMNZCFew=="/>
     </p:ext>
   </p:extLst>
 </p:presentation>
@@ -1838,7 +1838,11 @@
               </a:spcAft>
               <a:buNone/>
             </a:pPr>
-            <a:endParaRPr/>
+            <a:r>
+              <a:rPr lang="en-GB" dirty="0"/>
+              <a:t>MOOCS</a:t>
+            </a:r>
+            <a:endParaRPr dirty="0"/>
           </a:p>
         </p:txBody>
       </p:sp>
@@ -2037,6 +2041,109 @@
           </a:bodyPr>
           <a:lstStyle/>
           <a:p>
+            <a:pPr marL="0" indent="0">
+              <a:spcBef>
+                <a:spcPts val="0"/>
+              </a:spcBef>
+              <a:buClr>
+                <a:schemeClr val="dk1"/>
+              </a:buClr>
+              <a:buSzPts val="2400"/>
+              <a:buFont typeface="Libre Franklin"/>
+              <a:buNone/>
+            </a:pPr>
+            <a:r>
+              <a:rPr lang="en-GB" b="1" dirty="0">
+                <a:latin typeface="Libre Franklin"/>
+                <a:ea typeface="Libre Franklin"/>
+                <a:cs typeface="Libre Franklin"/>
+                <a:sym typeface="Libre Franklin"/>
+              </a:rPr>
+              <a:t>Research Questions:</a:t>
+            </a:r>
+            <a:br>
+              <a:rPr lang="en-GB" b="1" dirty="0">
+                <a:latin typeface="Libre Franklin"/>
+                <a:ea typeface="Libre Franklin"/>
+                <a:cs typeface="Libre Franklin"/>
+                <a:sym typeface="Libre Franklin"/>
+              </a:rPr>
+            </a:br>
+            <a:endParaRPr lang="en-GB" b="1" dirty="0">
+              <a:latin typeface="Libre Franklin"/>
+              <a:ea typeface="Libre Franklin"/>
+              <a:cs typeface="Libre Franklin"/>
+              <a:sym typeface="Libre Franklin"/>
+            </a:endParaRPr>
+          </a:p>
+          <a:p>
+            <a:pPr marL="342900" indent="-342900">
+              <a:spcBef>
+                <a:spcPts val="0"/>
+              </a:spcBef>
+              <a:buClr>
+                <a:schemeClr val="dk1"/>
+              </a:buClr>
+              <a:buSzPts val="2400"/>
+              <a:buFont typeface="+mj-lt"/>
+              <a:buAutoNum type="arabicPeriod"/>
+            </a:pPr>
+            <a:r>
+              <a:rPr lang="en-GB" dirty="0"/>
+              <a:t>How can a knowledge graph improve the retrieval process in a RAG-based learning system to ensure structured and relevant content delivery ?</a:t>
+            </a:r>
+          </a:p>
+          <a:p>
+            <a:pPr marL="342900" indent="-342900">
+              <a:spcBef>
+                <a:spcPts val="0"/>
+              </a:spcBef>
+              <a:buClr>
+                <a:schemeClr val="dk1"/>
+              </a:buClr>
+              <a:buSzPts val="2400"/>
+              <a:buFont typeface="+mj-lt"/>
+              <a:buAutoNum type="arabicPeriod"/>
+            </a:pPr>
+            <a:endParaRPr lang="en-GB" dirty="0"/>
+          </a:p>
+          <a:p>
+            <a:pPr marL="342900" indent="-342900">
+              <a:spcBef>
+                <a:spcPts val="0"/>
+              </a:spcBef>
+              <a:buClr>
+                <a:schemeClr val="dk1"/>
+              </a:buClr>
+              <a:buSzPts val="2400"/>
+              <a:buFont typeface="+mj-lt"/>
+              <a:buAutoNum type="arabicPeriod"/>
+            </a:pPr>
+            <a:r>
+              <a:rPr lang="en-GB" dirty="0"/>
+              <a:t>How can the results of the learner to the generated question be used to adaptively guide learners through content ?</a:t>
+            </a:r>
+          </a:p>
+          <a:p>
+            <a:pPr marL="342900" indent="-342900">
+              <a:spcBef>
+                <a:spcPts val="0"/>
+              </a:spcBef>
+              <a:buClr>
+                <a:schemeClr val="dk1"/>
+              </a:buClr>
+              <a:buSzPts val="2400"/>
+              <a:buFont typeface="+mj-lt"/>
+              <a:buAutoNum type="arabicPeriod"/>
+            </a:pPr>
+            <a:endParaRPr lang="en-GB" b="1" dirty="0">
+              <a:latin typeface="Libre Franklin"/>
+              <a:ea typeface="Libre Franklin"/>
+              <a:cs typeface="Libre Franklin"/>
+              <a:sym typeface="Libre Franklin"/>
+            </a:endParaRPr>
+          </a:p>
+          <a:p>
             <a:pPr marL="0" lvl="0" indent="0" algn="l" rtl="0">
               <a:spcBef>
                 <a:spcPts val="0"/>
@@ -2046,7 +2153,7 @@
               </a:spcAft>
               <a:buNone/>
             </a:pPr>
-            <a:endParaRPr/>
+            <a:endParaRPr dirty="0"/>
           </a:p>
         </p:txBody>
       </p:sp>
@@ -3279,7 +3386,7 @@
         <p:fade/>
       </p:transition>
     </mc:Choice>
-    <mc:Fallback xmlns="" xmlns:mv="urn:schemas-microsoft-com:mac:vml" xmlns:c="http://schemas.openxmlformats.org/drawingml/2006/chart" xmlns:dgm="http://schemas.openxmlformats.org/drawingml/2006/diagram" xmlns:o="urn:schemas-microsoft-com:office:office" xmlns:v="urn:schemas-microsoft-com:vml" xmlns:pvml="urn:schemas-microsoft-com:office:powerpoint" xmlns:com="http://schemas.openxmlformats.org/drawingml/2006/compatibility" xmlns:p15="http://schemas.microsoft.com/office/powerpoint/2012/main" xmlns:ahyp="http://schemas.microsoft.com/office/drawing/2018/hyperlinkcolor">
+    <mc:Fallback xmlns:ahyp="http://schemas.microsoft.com/office/drawing/2018/hyperlinkcolor" xmlns:p15="http://schemas.microsoft.com/office/powerpoint/2012/main" xmlns:com="http://schemas.openxmlformats.org/drawingml/2006/compatibility" xmlns:pvml="urn:schemas-microsoft-com:office:powerpoint" xmlns:v="urn:schemas-microsoft-com:vml" xmlns:o="urn:schemas-microsoft-com:office:office" xmlns:dgm="http://schemas.openxmlformats.org/drawingml/2006/diagram" xmlns:c="http://schemas.openxmlformats.org/drawingml/2006/chart" xmlns:mv="urn:schemas-microsoft-com:mac:vml" xmlns="">
       <p:transition spd="slow">
         <p:fade/>
       </p:transition>
@@ -22609,7 +22716,7 @@
         <p:fade/>
       </p:transition>
     </mc:Choice>
-    <mc:Fallback xmlns="" xmlns:mv="urn:schemas-microsoft-com:mac:vml" xmlns:c="http://schemas.openxmlformats.org/drawingml/2006/chart" xmlns:dgm="http://schemas.openxmlformats.org/drawingml/2006/diagram" xmlns:o="urn:schemas-microsoft-com:office:office" xmlns:v="urn:schemas-microsoft-com:vml" xmlns:pvml="urn:schemas-microsoft-com:office:powerpoint" xmlns:com="http://schemas.openxmlformats.org/drawingml/2006/compatibility" xmlns:p15="http://schemas.microsoft.com/office/powerpoint/2012/main" xmlns:ahyp="http://schemas.microsoft.com/office/drawing/2018/hyperlinkcolor">
+    <mc:Fallback xmlns:ahyp="http://schemas.microsoft.com/office/drawing/2018/hyperlinkcolor" xmlns:p15="http://schemas.microsoft.com/office/powerpoint/2012/main" xmlns:com="http://schemas.openxmlformats.org/drawingml/2006/compatibility" xmlns:pvml="urn:schemas-microsoft-com:office:powerpoint" xmlns:v="urn:schemas-microsoft-com:vml" xmlns:o="urn:schemas-microsoft-com:office:office" xmlns:dgm="http://schemas.openxmlformats.org/drawingml/2006/diagram" xmlns:c="http://schemas.openxmlformats.org/drawingml/2006/chart" xmlns:mv="urn:schemas-microsoft-com:mac:vml" xmlns="">
       <p:transition spd="slow">
         <p:fade/>
       </p:transition>
@@ -22701,8 +22808,8 @@
         </p:nvSpPr>
         <p:spPr>
           <a:xfrm>
-            <a:off x="960858" y="851824"/>
-            <a:ext cx="7726500" cy="338867"/>
+            <a:off x="1008691" y="702212"/>
+            <a:ext cx="7850973" cy="676843"/>
           </a:xfrm>
           <a:prstGeom prst="rect">
             <a:avLst/>
@@ -22714,7 +22821,7 @@
         </p:spPr>
         <p:txBody>
           <a:bodyPr spcFirstLastPara="1" wrap="square" lIns="180000" tIns="45700" rIns="91425" bIns="45700" anchor="t" anchorCtr="0">
-            <a:normAutofit lnSpcReduction="10000"/>
+            <a:normAutofit/>
           </a:bodyPr>
           <a:lstStyle/>
           <a:p>
@@ -22729,7 +22836,7 @@
             </a:pPr>
             <a:r>
               <a:rPr lang="fr-CH" sz="2000" dirty="0"/>
-              <a:t>Traditional learning methods: all information at once</a:t>
+              <a:t>Traditional learning methods (e.g. MOOCs): all information at once</a:t>
             </a:r>
             <a:endParaRPr sz="2000" dirty="0">
               <a:latin typeface="Libre Franklin"/>
@@ -22737,72 +22844,6 @@
               <a:cs typeface="Libre Franklin"/>
               <a:sym typeface="Libre Franklin"/>
             </a:endParaRPr>
-          </a:p>
-        </p:txBody>
-      </p:sp>
-      <p:sp>
-        <p:nvSpPr>
-          <p:cNvPr id="198" name="Google Shape;198;g339bfdd99ff_0_12"/>
-          <p:cNvSpPr txBox="1">
-            <a:spLocks noGrp="1"/>
-          </p:cNvSpPr>
-          <p:nvPr>
-            <p:ph type="body" idx="2"/>
-          </p:nvPr>
-        </p:nvSpPr>
-        <p:spPr>
-          <a:xfrm>
-            <a:off x="626525" y="4828248"/>
-            <a:ext cx="7726500" cy="240000"/>
-          </a:xfrm>
-          <a:prstGeom prst="rect">
-            <a:avLst/>
-          </a:prstGeom>
-          <a:noFill/>
-          <a:ln>
-            <a:noFill/>
-          </a:ln>
-        </p:spPr>
-        <p:txBody>
-          <a:bodyPr spcFirstLastPara="1" wrap="square" lIns="180000" tIns="45700" rIns="91425" bIns="45700" anchor="t" anchorCtr="0">
-            <a:noAutofit/>
-          </a:bodyPr>
-          <a:lstStyle/>
-          <a:p>
-            <a:pPr marL="0" lvl="0" indent="0" algn="l" rtl="0">
-              <a:lnSpc>
-                <a:spcPct val="70000"/>
-              </a:lnSpc>
-              <a:spcBef>
-                <a:spcPts val="0"/>
-              </a:spcBef>
-              <a:spcAft>
-                <a:spcPts val="0"/>
-              </a:spcAft>
-              <a:buSzPts val="405"/>
-              <a:buNone/>
-            </a:pPr>
-            <a:r>
-              <a:rPr lang="de-DE" sz="1050" dirty="0"/>
-              <a:t>References</a:t>
-            </a:r>
-            <a:endParaRPr sz="1050" dirty="0"/>
-          </a:p>
-          <a:p>
-            <a:pPr marL="0" lvl="0" indent="0" algn="l" rtl="0">
-              <a:lnSpc>
-                <a:spcPct val="70000"/>
-              </a:lnSpc>
-              <a:spcBef>
-                <a:spcPts val="750"/>
-              </a:spcBef>
-              <a:spcAft>
-                <a:spcPts val="0"/>
-              </a:spcAft>
-              <a:buSzPts val="405"/>
-              <a:buNone/>
-            </a:pPr>
-            <a:endParaRPr sz="1050" dirty="0"/>
           </a:p>
         </p:txBody>
       </p:sp>
@@ -23937,6 +23978,300 @@
   <p:clrMapOvr>
     <a:masterClrMapping/>
   </p:clrMapOvr>
+  <p:timing>
+    <p:tnLst>
+      <p:par>
+        <p:cTn id="1" dur="indefinite" restart="never" nodeType="tmRoot">
+          <p:childTnLst>
+            <p:seq concurrent="1" nextAc="seek">
+              <p:cTn id="2" dur="indefinite" nodeType="mainSeq">
+                <p:childTnLst>
+                  <p:par>
+                    <p:cTn id="3" fill="hold">
+                      <p:stCondLst>
+                        <p:cond delay="indefinite"/>
+                      </p:stCondLst>
+                      <p:childTnLst>
+                        <p:par>
+                          <p:cTn id="4" fill="hold">
+                            <p:stCondLst>
+                              <p:cond delay="0"/>
+                            </p:stCondLst>
+                            <p:childTnLst>
+                              <p:par>
+                                <p:cTn id="5" presetID="1" presetClass="entr" presetSubtype="0" fill="hold" grpId="0" nodeType="clickEffect">
+                                  <p:stCondLst>
+                                    <p:cond delay="0"/>
+                                  </p:stCondLst>
+                                  <p:childTnLst>
+                                    <p:set>
+                                      <p:cBhvr>
+                                        <p:cTn id="6" dur="1" fill="hold">
+                                          <p:stCondLst>
+                                            <p:cond delay="0"/>
+                                          </p:stCondLst>
+                                        </p:cTn>
+                                        <p:tgtEl>
+                                          <p:spTgt spid="196">
+                                            <p:txEl>
+                                              <p:pRg st="0" end="0"/>
+                                            </p:txEl>
+                                          </p:spTgt>
+                                        </p:tgtEl>
+                                        <p:attrNameLst>
+                                          <p:attrName>style.visibility</p:attrName>
+                                        </p:attrNameLst>
+                                      </p:cBhvr>
+                                      <p:to>
+                                        <p:strVal val="visible"/>
+                                      </p:to>
+                                    </p:set>
+                                  </p:childTnLst>
+                                </p:cTn>
+                              </p:par>
+                              <p:par>
+                                <p:cTn id="7" presetID="1" presetClass="entr" presetSubtype="0" fill="hold" grpId="0" nodeType="withEffect">
+                                  <p:stCondLst>
+                                    <p:cond delay="0"/>
+                                  </p:stCondLst>
+                                  <p:childTnLst>
+                                    <p:set>
+                                      <p:cBhvr>
+                                        <p:cTn id="8" dur="1" fill="hold">
+                                          <p:stCondLst>
+                                            <p:cond delay="0"/>
+                                          </p:stCondLst>
+                                        </p:cTn>
+                                        <p:tgtEl>
+                                          <p:spTgt spid="10"/>
+                                        </p:tgtEl>
+                                        <p:attrNameLst>
+                                          <p:attrName>style.visibility</p:attrName>
+                                        </p:attrNameLst>
+                                      </p:cBhvr>
+                                      <p:to>
+                                        <p:strVal val="visible"/>
+                                      </p:to>
+                                    </p:set>
+                                  </p:childTnLst>
+                                </p:cTn>
+                              </p:par>
+                              <p:par>
+                                <p:cTn id="9" presetID="1" presetClass="entr" presetSubtype="0" fill="hold" nodeType="withEffect">
+                                  <p:stCondLst>
+                                    <p:cond delay="0"/>
+                                  </p:stCondLst>
+                                  <p:childTnLst>
+                                    <p:set>
+                                      <p:cBhvr>
+                                        <p:cTn id="10" dur="1" fill="hold">
+                                          <p:stCondLst>
+                                            <p:cond delay="0"/>
+                                          </p:stCondLst>
+                                        </p:cTn>
+                                        <p:tgtEl>
+                                          <p:spTgt spid="13"/>
+                                        </p:tgtEl>
+                                        <p:attrNameLst>
+                                          <p:attrName>style.visibility</p:attrName>
+                                        </p:attrNameLst>
+                                      </p:cBhvr>
+                                      <p:to>
+                                        <p:strVal val="visible"/>
+                                      </p:to>
+                                    </p:set>
+                                  </p:childTnLst>
+                                </p:cTn>
+                              </p:par>
+                              <p:par>
+                                <p:cTn id="11" presetID="1" presetClass="entr" presetSubtype="0" fill="hold" grpId="0" nodeType="withEffect">
+                                  <p:stCondLst>
+                                    <p:cond delay="0"/>
+                                  </p:stCondLst>
+                                  <p:childTnLst>
+                                    <p:set>
+                                      <p:cBhvr>
+                                        <p:cTn id="12" dur="1" fill="hold">
+                                          <p:stCondLst>
+                                            <p:cond delay="0"/>
+                                          </p:stCondLst>
+                                        </p:cTn>
+                                        <p:tgtEl>
+                                          <p:spTgt spid="14"/>
+                                        </p:tgtEl>
+                                        <p:attrNameLst>
+                                          <p:attrName>style.visibility</p:attrName>
+                                        </p:attrNameLst>
+                                      </p:cBhvr>
+                                      <p:to>
+                                        <p:strVal val="visible"/>
+                                      </p:to>
+                                    </p:set>
+                                  </p:childTnLst>
+                                </p:cTn>
+                              </p:par>
+                            </p:childTnLst>
+                          </p:cTn>
+                        </p:par>
+                      </p:childTnLst>
+                    </p:cTn>
+                  </p:par>
+                  <p:par>
+                    <p:cTn id="13" fill="hold">
+                      <p:stCondLst>
+                        <p:cond delay="indefinite"/>
+                      </p:stCondLst>
+                      <p:childTnLst>
+                        <p:par>
+                          <p:cTn id="14" fill="hold">
+                            <p:stCondLst>
+                              <p:cond delay="0"/>
+                            </p:stCondLst>
+                            <p:childTnLst>
+                              <p:par>
+                                <p:cTn id="15" presetID="1" presetClass="entr" presetSubtype="0" fill="hold" grpId="0" nodeType="clickEffect">
+                                  <p:stCondLst>
+                                    <p:cond delay="0"/>
+                                  </p:stCondLst>
+                                  <p:childTnLst>
+                                    <p:set>
+                                      <p:cBhvr>
+                                        <p:cTn id="16" dur="1" fill="hold">
+                                          <p:stCondLst>
+                                            <p:cond delay="0"/>
+                                          </p:stCondLst>
+                                        </p:cTn>
+                                        <p:tgtEl>
+                                          <p:spTgt spid="19"/>
+                                        </p:tgtEl>
+                                        <p:attrNameLst>
+                                          <p:attrName>style.visibility</p:attrName>
+                                        </p:attrNameLst>
+                                      </p:cBhvr>
+                                      <p:to>
+                                        <p:strVal val="visible"/>
+                                      </p:to>
+                                    </p:set>
+                                  </p:childTnLst>
+                                </p:cTn>
+                              </p:par>
+                              <p:par>
+                                <p:cTn id="17" presetID="1" presetClass="entr" presetSubtype="0" fill="hold" grpId="0" nodeType="withEffect">
+                                  <p:stCondLst>
+                                    <p:cond delay="0"/>
+                                  </p:stCondLst>
+                                  <p:childTnLst>
+                                    <p:set>
+                                      <p:cBhvr>
+                                        <p:cTn id="18" dur="1" fill="hold">
+                                          <p:stCondLst>
+                                            <p:cond delay="0"/>
+                                          </p:stCondLst>
+                                        </p:cTn>
+                                        <p:tgtEl>
+                                          <p:spTgt spid="16"/>
+                                        </p:tgtEl>
+                                        <p:attrNameLst>
+                                          <p:attrName>style.visibility</p:attrName>
+                                        </p:attrNameLst>
+                                      </p:cBhvr>
+                                      <p:to>
+                                        <p:strVal val="visible"/>
+                                      </p:to>
+                                    </p:set>
+                                  </p:childTnLst>
+                                </p:cTn>
+                              </p:par>
+                              <p:par>
+                                <p:cTn id="19" presetID="1" presetClass="entr" presetSubtype="0" fill="hold" nodeType="withEffect">
+                                  <p:stCondLst>
+                                    <p:cond delay="0"/>
+                                  </p:stCondLst>
+                                  <p:childTnLst>
+                                    <p:set>
+                                      <p:cBhvr>
+                                        <p:cTn id="20" dur="1" fill="hold">
+                                          <p:stCondLst>
+                                            <p:cond delay="0"/>
+                                          </p:stCondLst>
+                                        </p:cTn>
+                                        <p:tgtEl>
+                                          <p:spTgt spid="18"/>
+                                        </p:tgtEl>
+                                        <p:attrNameLst>
+                                          <p:attrName>style.visibility</p:attrName>
+                                        </p:attrNameLst>
+                                      </p:cBhvr>
+                                      <p:to>
+                                        <p:strVal val="visible"/>
+                                      </p:to>
+                                    </p:set>
+                                  </p:childTnLst>
+                                </p:cTn>
+                              </p:par>
+                              <p:par>
+                                <p:cTn id="21" presetID="1" presetClass="entr" presetSubtype="0" fill="hold" grpId="0" nodeType="withEffect">
+                                  <p:stCondLst>
+                                    <p:cond delay="0"/>
+                                  </p:stCondLst>
+                                  <p:childTnLst>
+                                    <p:set>
+                                      <p:cBhvr>
+                                        <p:cTn id="22" dur="1" fill="hold">
+                                          <p:stCondLst>
+                                            <p:cond delay="0"/>
+                                          </p:stCondLst>
+                                        </p:cTn>
+                                        <p:tgtEl>
+                                          <p:spTgt spid="15"/>
+                                        </p:tgtEl>
+                                        <p:attrNameLst>
+                                          <p:attrName>style.visibility</p:attrName>
+                                        </p:attrNameLst>
+                                      </p:cBhvr>
+                                      <p:to>
+                                        <p:strVal val="visible"/>
+                                      </p:to>
+                                    </p:set>
+                                  </p:childTnLst>
+                                </p:cTn>
+                              </p:par>
+                            </p:childTnLst>
+                          </p:cTn>
+                        </p:par>
+                      </p:childTnLst>
+                    </p:cTn>
+                  </p:par>
+                </p:childTnLst>
+              </p:cTn>
+              <p:prevCondLst>
+                <p:cond evt="onPrev" delay="0">
+                  <p:tgtEl>
+                    <p:sldTgt/>
+                  </p:tgtEl>
+                </p:cond>
+              </p:prevCondLst>
+              <p:nextCondLst>
+                <p:cond evt="onNext" delay="0">
+                  <p:tgtEl>
+                    <p:sldTgt/>
+                  </p:tgtEl>
+                </p:cond>
+              </p:nextCondLst>
+            </p:seq>
+          </p:childTnLst>
+        </p:cTn>
+      </p:par>
+    </p:tnLst>
+    <p:bldLst>
+      <p:bldP spid="196" grpId="0" build="p"/>
+      <p:bldP spid="10" grpId="0" animBg="1"/>
+      <p:bldP spid="14" grpId="0"/>
+      <p:bldP spid="15" grpId="0"/>
+      <p:bldP spid="16" grpId="0" animBg="1"/>
+      <p:bldP spid="19" grpId="0"/>
+    </p:bldLst>
+  </p:timing>
 </p:sld>
 </file>
 
@@ -24058,72 +24393,6 @@
               <a:t>Scientific related work</a:t>
             </a:r>
             <a:endParaRPr sz="2000" dirty="0"/>
-          </a:p>
-        </p:txBody>
-      </p:sp>
-      <p:sp>
-        <p:nvSpPr>
-          <p:cNvPr id="207" name="Google Shape;207;g339bfdd99ff_0_20"/>
-          <p:cNvSpPr txBox="1">
-            <a:spLocks noGrp="1"/>
-          </p:cNvSpPr>
-          <p:nvPr>
-            <p:ph type="body" idx="2"/>
-          </p:nvPr>
-        </p:nvSpPr>
-        <p:spPr>
-          <a:xfrm>
-            <a:off x="626525" y="4828248"/>
-            <a:ext cx="7726500" cy="240000"/>
-          </a:xfrm>
-          <a:prstGeom prst="rect">
-            <a:avLst/>
-          </a:prstGeom>
-          <a:noFill/>
-          <a:ln>
-            <a:noFill/>
-          </a:ln>
-        </p:spPr>
-        <p:txBody>
-          <a:bodyPr spcFirstLastPara="1" wrap="square" lIns="180000" tIns="45700" rIns="91425" bIns="45700" anchor="t" anchorCtr="0">
-            <a:noAutofit/>
-          </a:bodyPr>
-          <a:lstStyle/>
-          <a:p>
-            <a:pPr marL="0" lvl="0" indent="0" algn="l" rtl="0">
-              <a:lnSpc>
-                <a:spcPct val="70000"/>
-              </a:lnSpc>
-              <a:spcBef>
-                <a:spcPts val="0"/>
-              </a:spcBef>
-              <a:spcAft>
-                <a:spcPts val="0"/>
-              </a:spcAft>
-              <a:buSzPts val="405"/>
-              <a:buNone/>
-            </a:pPr>
-            <a:r>
-              <a:rPr lang="de-DE" sz="1050"/>
-              <a:t>References</a:t>
-            </a:r>
-            <a:endParaRPr sz="1050"/>
-          </a:p>
-          <a:p>
-            <a:pPr marL="0" lvl="0" indent="0" algn="l" rtl="0">
-              <a:lnSpc>
-                <a:spcPct val="70000"/>
-              </a:lnSpc>
-              <a:spcBef>
-                <a:spcPts val="750"/>
-              </a:spcBef>
-              <a:spcAft>
-                <a:spcPts val="0"/>
-              </a:spcAft>
-              <a:buSzPts val="405"/>
-              <a:buNone/>
-            </a:pPr>
-            <a:endParaRPr sz="1050"/>
           </a:p>
         </p:txBody>
       </p:sp>
@@ -24584,72 +24853,6 @@
           </a:p>
         </p:txBody>
       </p:sp>
-      <p:sp>
-        <p:nvSpPr>
-          <p:cNvPr id="216" name="Google Shape;216;g339bfdd99ff_0_28"/>
-          <p:cNvSpPr txBox="1">
-            <a:spLocks noGrp="1"/>
-          </p:cNvSpPr>
-          <p:nvPr>
-            <p:ph type="body" idx="2"/>
-          </p:nvPr>
-        </p:nvSpPr>
-        <p:spPr>
-          <a:xfrm>
-            <a:off x="626525" y="4828248"/>
-            <a:ext cx="7726500" cy="240000"/>
-          </a:xfrm>
-          <a:prstGeom prst="rect">
-            <a:avLst/>
-          </a:prstGeom>
-          <a:noFill/>
-          <a:ln>
-            <a:noFill/>
-          </a:ln>
-        </p:spPr>
-        <p:txBody>
-          <a:bodyPr spcFirstLastPara="1" wrap="square" lIns="180000" tIns="45700" rIns="91425" bIns="45700" anchor="t" anchorCtr="0">
-            <a:noAutofit/>
-          </a:bodyPr>
-          <a:lstStyle/>
-          <a:p>
-            <a:pPr marL="0" lvl="0" indent="0" algn="l" rtl="0">
-              <a:lnSpc>
-                <a:spcPct val="70000"/>
-              </a:lnSpc>
-              <a:spcBef>
-                <a:spcPts val="0"/>
-              </a:spcBef>
-              <a:spcAft>
-                <a:spcPts val="0"/>
-              </a:spcAft>
-              <a:buSzPts val="405"/>
-              <a:buNone/>
-            </a:pPr>
-            <a:r>
-              <a:rPr lang="de-DE" sz="1050" dirty="0"/>
-              <a:t>References</a:t>
-            </a:r>
-            <a:endParaRPr sz="1050" dirty="0"/>
-          </a:p>
-          <a:p>
-            <a:pPr marL="0" lvl="0" indent="0" algn="l" rtl="0">
-              <a:lnSpc>
-                <a:spcPct val="70000"/>
-              </a:lnSpc>
-              <a:spcBef>
-                <a:spcPts val="750"/>
-              </a:spcBef>
-              <a:spcAft>
-                <a:spcPts val="0"/>
-              </a:spcAft>
-              <a:buSzPts val="405"/>
-              <a:buNone/>
-            </a:pPr>
-            <a:endParaRPr sz="1050" dirty="0"/>
-          </a:p>
-        </p:txBody>
-      </p:sp>
       <p:pic>
         <p:nvPicPr>
           <p:cNvPr id="217" name="Google Shape;217;g339bfdd99ff_0_28"/>
@@ -25040,7 +25243,7 @@
         </p:spPr>
         <p:txBody>
           <a:bodyPr spcFirstLastPara="1" wrap="square" lIns="180000" tIns="45700" rIns="91425" bIns="45700" anchor="t" anchorCtr="0">
-            <a:normAutofit lnSpcReduction="10000"/>
+            <a:normAutofit fontScale="92500" lnSpcReduction="20000"/>
           </a:bodyPr>
           <a:lstStyle>
             <a:defPPr marR="0" lvl="0" algn="l" rtl="0">
@@ -25339,21 +25542,11 @@
             </a:pPr>
             <a:r>
               <a:rPr lang="en-GB" dirty="0"/>
-              <a:t>How can a knowledge graph improve the retrieval process in a RAG-based learning system to ensure structured and relevant content delivery ?</a:t>
+              <a:t>How can we extract bite-sized blocks of learning materials through a RAG system for structured and relevant content delivery ?</a:t>
             </a:r>
-          </a:p>
-          <a:p>
-            <a:pPr marL="342900" indent="-342900">
-              <a:spcBef>
-                <a:spcPts val="0"/>
-              </a:spcBef>
-              <a:buClr>
-                <a:schemeClr val="dk1"/>
-              </a:buClr>
-              <a:buSzPts val="2400"/>
-              <a:buFont typeface="+mj-lt"/>
-              <a:buAutoNum type="arabicPeriod"/>
-            </a:pPr>
+            <a:br>
+              <a:rPr lang="en-GB" dirty="0"/>
+            </a:br>
             <a:endParaRPr lang="en-GB" dirty="0"/>
           </a:p>
           <a:p>
@@ -25370,7 +25563,28 @@
             </a:pPr>
             <a:r>
               <a:rPr lang="en-GB" dirty="0"/>
-              <a:t>How can the results of the learner to the generated question be used to adaptively guide learners through content ?</a:t>
+              <a:t>How can we generate trustworthy Bloom’s Taxonomy questions to adaptively guide learners through content ?</a:t>
+            </a:r>
+            <a:br>
+              <a:rPr lang="en-GB" dirty="0"/>
+            </a:br>
+            <a:endParaRPr lang="en-GB" dirty="0"/>
+          </a:p>
+          <a:p>
+            <a:pPr marL="342900" indent="-342900">
+              <a:spcBef>
+                <a:spcPts val="0"/>
+              </a:spcBef>
+              <a:buClr>
+                <a:schemeClr val="dk1"/>
+              </a:buClr>
+              <a:buSzPts val="2400"/>
+              <a:buFont typeface="+mj-lt"/>
+              <a:buAutoNum type="arabicPeriod"/>
+            </a:pPr>
+            <a:r>
+              <a:rPr lang="en-GB" dirty="0"/>
+              <a:t>How does our pipeline compare to a standard MOOC static content delivery (user perception and learning) ?</a:t>
             </a:r>
           </a:p>
           <a:p>
@@ -25399,6 +25613,280 @@
   <p:clrMapOvr>
     <a:masterClrMapping/>
   </p:clrMapOvr>
+  <p:timing>
+    <p:tnLst>
+      <p:par>
+        <p:cTn id="1" dur="indefinite" restart="never" nodeType="tmRoot">
+          <p:childTnLst>
+            <p:seq concurrent="1" nextAc="seek">
+              <p:cTn id="2" dur="indefinite" nodeType="mainSeq">
+                <p:childTnLst>
+                  <p:par>
+                    <p:cTn id="3" fill="hold">
+                      <p:stCondLst>
+                        <p:cond delay="indefinite"/>
+                      </p:stCondLst>
+                      <p:childTnLst>
+                        <p:par>
+                          <p:cTn id="4" fill="hold">
+                            <p:stCondLst>
+                              <p:cond delay="0"/>
+                            </p:stCondLst>
+                            <p:childTnLst>
+                              <p:par>
+                                <p:cTn id="5" presetID="1" presetClass="entr" presetSubtype="0" fill="hold" grpId="0" nodeType="clickEffect">
+                                  <p:stCondLst>
+                                    <p:cond delay="0"/>
+                                  </p:stCondLst>
+                                  <p:childTnLst>
+                                    <p:set>
+                                      <p:cBhvr>
+                                        <p:cTn id="6" dur="1" fill="hold">
+                                          <p:stCondLst>
+                                            <p:cond delay="0"/>
+                                          </p:stCondLst>
+                                        </p:cTn>
+                                        <p:tgtEl>
+                                          <p:spTgt spid="2"/>
+                                        </p:tgtEl>
+                                        <p:attrNameLst>
+                                          <p:attrName>style.visibility</p:attrName>
+                                        </p:attrNameLst>
+                                      </p:cBhvr>
+                                      <p:to>
+                                        <p:strVal val="visible"/>
+                                      </p:to>
+                                    </p:set>
+                                  </p:childTnLst>
+                                </p:cTn>
+                              </p:par>
+                            </p:childTnLst>
+                          </p:cTn>
+                        </p:par>
+                      </p:childTnLst>
+                    </p:cTn>
+                  </p:par>
+                  <p:par>
+                    <p:cTn id="7" fill="hold">
+                      <p:stCondLst>
+                        <p:cond delay="indefinite"/>
+                      </p:stCondLst>
+                      <p:childTnLst>
+                        <p:par>
+                          <p:cTn id="8" fill="hold">
+                            <p:stCondLst>
+                              <p:cond delay="0"/>
+                            </p:stCondLst>
+                            <p:childTnLst>
+                              <p:par>
+                                <p:cTn id="9" presetID="1" presetClass="entr" presetSubtype="0" fill="hold" nodeType="clickEffect">
+                                  <p:stCondLst>
+                                    <p:cond delay="0"/>
+                                  </p:stCondLst>
+                                  <p:childTnLst>
+                                    <p:set>
+                                      <p:cBhvr>
+                                        <p:cTn id="10" dur="1" fill="hold">
+                                          <p:stCondLst>
+                                            <p:cond delay="0"/>
+                                          </p:stCondLst>
+                                        </p:cTn>
+                                        <p:tgtEl>
+                                          <p:spTgt spid="5">
+                                            <p:txEl>
+                                              <p:pRg st="0" end="0"/>
+                                            </p:txEl>
+                                          </p:spTgt>
+                                        </p:tgtEl>
+                                        <p:attrNameLst>
+                                          <p:attrName>style.visibility</p:attrName>
+                                        </p:attrNameLst>
+                                      </p:cBhvr>
+                                      <p:to>
+                                        <p:strVal val="visible"/>
+                                      </p:to>
+                                    </p:set>
+                                  </p:childTnLst>
+                                </p:cTn>
+                              </p:par>
+                            </p:childTnLst>
+                          </p:cTn>
+                        </p:par>
+                      </p:childTnLst>
+                    </p:cTn>
+                  </p:par>
+                  <p:par>
+                    <p:cTn id="11" fill="hold">
+                      <p:stCondLst>
+                        <p:cond delay="indefinite"/>
+                      </p:stCondLst>
+                      <p:childTnLst>
+                        <p:par>
+                          <p:cTn id="12" fill="hold">
+                            <p:stCondLst>
+                              <p:cond delay="0"/>
+                            </p:stCondLst>
+                            <p:childTnLst>
+                              <p:par>
+                                <p:cTn id="13" presetID="1" presetClass="entr" presetSubtype="0" fill="hold" nodeType="clickEffect">
+                                  <p:stCondLst>
+                                    <p:cond delay="0"/>
+                                  </p:stCondLst>
+                                  <p:childTnLst>
+                                    <p:set>
+                                      <p:cBhvr>
+                                        <p:cTn id="14" dur="1" fill="hold">
+                                          <p:stCondLst>
+                                            <p:cond delay="0"/>
+                                          </p:stCondLst>
+                                        </p:cTn>
+                                        <p:tgtEl>
+                                          <p:spTgt spid="5">
+                                            <p:txEl>
+                                              <p:pRg st="1" end="1"/>
+                                            </p:txEl>
+                                          </p:spTgt>
+                                        </p:tgtEl>
+                                        <p:attrNameLst>
+                                          <p:attrName>style.visibility</p:attrName>
+                                        </p:attrNameLst>
+                                      </p:cBhvr>
+                                      <p:to>
+                                        <p:strVal val="visible"/>
+                                      </p:to>
+                                    </p:set>
+                                  </p:childTnLst>
+                                </p:cTn>
+                              </p:par>
+                            </p:childTnLst>
+                          </p:cTn>
+                        </p:par>
+                      </p:childTnLst>
+                    </p:cTn>
+                  </p:par>
+                  <p:par>
+                    <p:cTn id="15" fill="hold">
+                      <p:stCondLst>
+                        <p:cond delay="indefinite"/>
+                      </p:stCondLst>
+                      <p:childTnLst>
+                        <p:par>
+                          <p:cTn id="16" fill="hold">
+                            <p:stCondLst>
+                              <p:cond delay="0"/>
+                            </p:stCondLst>
+                            <p:childTnLst>
+                              <p:par>
+                                <p:cTn id="17" presetID="1" presetClass="entr" presetSubtype="0" fill="hold" nodeType="clickEffect">
+                                  <p:stCondLst>
+                                    <p:cond delay="0"/>
+                                  </p:stCondLst>
+                                  <p:childTnLst>
+                                    <p:set>
+                                      <p:cBhvr>
+                                        <p:cTn id="18" dur="1" fill="hold">
+                                          <p:stCondLst>
+                                            <p:cond delay="0"/>
+                                          </p:stCondLst>
+                                        </p:cTn>
+                                        <p:tgtEl>
+                                          <p:spTgt spid="5">
+                                            <p:txEl>
+                                              <p:pRg st="2" end="2"/>
+                                            </p:txEl>
+                                          </p:spTgt>
+                                        </p:tgtEl>
+                                        <p:attrNameLst>
+                                          <p:attrName>style.visibility</p:attrName>
+                                        </p:attrNameLst>
+                                      </p:cBhvr>
+                                      <p:to>
+                                        <p:strVal val="visible"/>
+                                      </p:to>
+                                    </p:set>
+                                  </p:childTnLst>
+                                </p:cTn>
+                              </p:par>
+                            </p:childTnLst>
+                          </p:cTn>
+                        </p:par>
+                      </p:childTnLst>
+                    </p:cTn>
+                  </p:par>
+                  <p:par>
+                    <p:cTn id="19" fill="hold">
+                      <p:stCondLst>
+                        <p:cond delay="indefinite"/>
+                      </p:stCondLst>
+                      <p:childTnLst>
+                        <p:par>
+                          <p:cTn id="20" fill="hold">
+                            <p:stCondLst>
+                              <p:cond delay="0"/>
+                            </p:stCondLst>
+                            <p:childTnLst>
+                              <p:par>
+                                <p:cTn id="21" presetID="1" presetClass="entr" presetSubtype="0" fill="hold" nodeType="clickEffect">
+                                  <p:stCondLst>
+                                    <p:cond delay="0"/>
+                                  </p:stCondLst>
+                                  <p:childTnLst>
+                                    <p:set>
+                                      <p:cBhvr>
+                                        <p:cTn id="22" dur="1" fill="hold">
+                                          <p:stCondLst>
+                                            <p:cond delay="0"/>
+                                          </p:stCondLst>
+                                        </p:cTn>
+                                        <p:tgtEl>
+                                          <p:spTgt spid="5">
+                                            <p:txEl>
+                                              <p:pRg st="3" end="3"/>
+                                            </p:txEl>
+                                          </p:spTgt>
+                                        </p:tgtEl>
+                                        <p:attrNameLst>
+                                          <p:attrName>style.visibility</p:attrName>
+                                        </p:attrNameLst>
+                                      </p:cBhvr>
+                                      <p:to>
+                                        <p:strVal val="visible"/>
+                                      </p:to>
+                                    </p:set>
+                                  </p:childTnLst>
+                                </p:cTn>
+                              </p:par>
+                            </p:childTnLst>
+                          </p:cTn>
+                        </p:par>
+                      </p:childTnLst>
+                    </p:cTn>
+                  </p:par>
+                </p:childTnLst>
+              </p:cTn>
+              <p:prevCondLst>
+                <p:cond evt="onPrev" delay="0">
+                  <p:tgtEl>
+                    <p:sldTgt/>
+                  </p:tgtEl>
+                </p:cond>
+              </p:prevCondLst>
+              <p:nextCondLst>
+                <p:cond evt="onNext" delay="0">
+                  <p:tgtEl>
+                    <p:sldTgt/>
+                  </p:tgtEl>
+                </p:cond>
+              </p:nextCondLst>
+            </p:seq>
+          </p:childTnLst>
+        </p:cTn>
+      </p:par>
+    </p:tnLst>
+    <p:bldLst>
+      <p:bldP spid="2" grpId="0" animBg="1"/>
+    </p:bldLst>
+  </p:timing>
 </p:sld>
 </file>
 
@@ -25515,10 +26003,6 @@
               <a:buSzPts val="405"/>
               <a:buNone/>
             </a:pPr>
-            <a:r>
-              <a:rPr lang="de-DE" sz="1050" dirty="0"/>
-              <a:t>References</a:t>
-            </a:r>
             <a:endParaRPr sz="1050" dirty="0"/>
           </a:p>
           <a:p>
@@ -25939,6 +26423,281 @@
   <p:clrMapOvr>
     <a:masterClrMapping/>
   </p:clrMapOvr>
+  <p:timing>
+    <p:tnLst>
+      <p:par>
+        <p:cTn id="1" dur="indefinite" restart="never" nodeType="tmRoot">
+          <p:childTnLst>
+            <p:seq concurrent="1" nextAc="seek">
+              <p:cTn id="2" dur="indefinite" nodeType="mainSeq">
+                <p:childTnLst>
+                  <p:par>
+                    <p:cTn id="3" fill="hold">
+                      <p:stCondLst>
+                        <p:cond delay="indefinite"/>
+                      </p:stCondLst>
+                      <p:childTnLst>
+                        <p:par>
+                          <p:cTn id="4" fill="hold">
+                            <p:stCondLst>
+                              <p:cond delay="0"/>
+                            </p:stCondLst>
+                            <p:childTnLst>
+                              <p:par>
+                                <p:cTn id="5" presetID="1" presetClass="entr" presetSubtype="0" fill="hold" nodeType="clickEffect">
+                                  <p:stCondLst>
+                                    <p:cond delay="0"/>
+                                  </p:stCondLst>
+                                  <p:childTnLst>
+                                    <p:set>
+                                      <p:cBhvr>
+                                        <p:cTn id="6" dur="1" fill="hold">
+                                          <p:stCondLst>
+                                            <p:cond delay="0"/>
+                                          </p:stCondLst>
+                                        </p:cTn>
+                                        <p:tgtEl>
+                                          <p:spTgt spid="2">
+                                            <p:txEl>
+                                              <p:pRg st="0" end="0"/>
+                                            </p:txEl>
+                                          </p:spTgt>
+                                        </p:tgtEl>
+                                        <p:attrNameLst>
+                                          <p:attrName>style.visibility</p:attrName>
+                                        </p:attrNameLst>
+                                      </p:cBhvr>
+                                      <p:to>
+                                        <p:strVal val="visible"/>
+                                      </p:to>
+                                    </p:set>
+                                  </p:childTnLst>
+                                </p:cTn>
+                              </p:par>
+                            </p:childTnLst>
+                          </p:cTn>
+                        </p:par>
+                      </p:childTnLst>
+                    </p:cTn>
+                  </p:par>
+                  <p:par>
+                    <p:cTn id="7" fill="hold">
+                      <p:stCondLst>
+                        <p:cond delay="indefinite"/>
+                      </p:stCondLst>
+                      <p:childTnLst>
+                        <p:par>
+                          <p:cTn id="8" fill="hold">
+                            <p:stCondLst>
+                              <p:cond delay="0"/>
+                            </p:stCondLst>
+                            <p:childTnLst>
+                              <p:par>
+                                <p:cTn id="9" presetID="1" presetClass="entr" presetSubtype="0" fill="hold" nodeType="clickEffect">
+                                  <p:stCondLst>
+                                    <p:cond delay="0"/>
+                                  </p:stCondLst>
+                                  <p:childTnLst>
+                                    <p:set>
+                                      <p:cBhvr>
+                                        <p:cTn id="10" dur="1" fill="hold">
+                                          <p:stCondLst>
+                                            <p:cond delay="0"/>
+                                          </p:stCondLst>
+                                        </p:cTn>
+                                        <p:tgtEl>
+                                          <p:spTgt spid="2">
+                                            <p:txEl>
+                                              <p:pRg st="1" end="1"/>
+                                            </p:txEl>
+                                          </p:spTgt>
+                                        </p:tgtEl>
+                                        <p:attrNameLst>
+                                          <p:attrName>style.visibility</p:attrName>
+                                        </p:attrNameLst>
+                                      </p:cBhvr>
+                                      <p:to>
+                                        <p:strVal val="visible"/>
+                                      </p:to>
+                                    </p:set>
+                                  </p:childTnLst>
+                                </p:cTn>
+                              </p:par>
+                            </p:childTnLst>
+                          </p:cTn>
+                        </p:par>
+                      </p:childTnLst>
+                    </p:cTn>
+                  </p:par>
+                  <p:par>
+                    <p:cTn id="11" fill="hold">
+                      <p:stCondLst>
+                        <p:cond delay="indefinite"/>
+                      </p:stCondLst>
+                      <p:childTnLst>
+                        <p:par>
+                          <p:cTn id="12" fill="hold">
+                            <p:stCondLst>
+                              <p:cond delay="0"/>
+                            </p:stCondLst>
+                            <p:childTnLst>
+                              <p:par>
+                                <p:cTn id="13" presetID="1" presetClass="entr" presetSubtype="0" fill="hold" nodeType="clickEffect">
+                                  <p:stCondLst>
+                                    <p:cond delay="0"/>
+                                  </p:stCondLst>
+                                  <p:childTnLst>
+                                    <p:set>
+                                      <p:cBhvr>
+                                        <p:cTn id="14" dur="1" fill="hold">
+                                          <p:stCondLst>
+                                            <p:cond delay="0"/>
+                                          </p:stCondLst>
+                                        </p:cTn>
+                                        <p:tgtEl>
+                                          <p:spTgt spid="2">
+                                            <p:txEl>
+                                              <p:pRg st="2" end="2"/>
+                                            </p:txEl>
+                                          </p:spTgt>
+                                        </p:tgtEl>
+                                        <p:attrNameLst>
+                                          <p:attrName>style.visibility</p:attrName>
+                                        </p:attrNameLst>
+                                      </p:cBhvr>
+                                      <p:to>
+                                        <p:strVal val="visible"/>
+                                      </p:to>
+                                    </p:set>
+                                  </p:childTnLst>
+                                </p:cTn>
+                              </p:par>
+                            </p:childTnLst>
+                          </p:cTn>
+                        </p:par>
+                      </p:childTnLst>
+                    </p:cTn>
+                  </p:par>
+                  <p:par>
+                    <p:cTn id="15" fill="hold">
+                      <p:stCondLst>
+                        <p:cond delay="indefinite"/>
+                      </p:stCondLst>
+                      <p:childTnLst>
+                        <p:par>
+                          <p:cTn id="16" fill="hold">
+                            <p:stCondLst>
+                              <p:cond delay="0"/>
+                            </p:stCondLst>
+                            <p:childTnLst>
+                              <p:par>
+                                <p:cTn id="17" presetID="1" presetClass="entr" presetSubtype="0" fill="hold" nodeType="clickEffect">
+                                  <p:stCondLst>
+                                    <p:cond delay="0"/>
+                                  </p:stCondLst>
+                                  <p:childTnLst>
+                                    <p:set>
+                                      <p:cBhvr>
+                                        <p:cTn id="18" dur="1" fill="hold">
+                                          <p:stCondLst>
+                                            <p:cond delay="0"/>
+                                          </p:stCondLst>
+                                        </p:cTn>
+                                        <p:tgtEl>
+                                          <p:spTgt spid="2">
+                                            <p:txEl>
+                                              <p:pRg st="3" end="3"/>
+                                            </p:txEl>
+                                          </p:spTgt>
+                                        </p:tgtEl>
+                                        <p:attrNameLst>
+                                          <p:attrName>style.visibility</p:attrName>
+                                        </p:attrNameLst>
+                                      </p:cBhvr>
+                                      <p:to>
+                                        <p:strVal val="visible"/>
+                                      </p:to>
+                                    </p:set>
+                                  </p:childTnLst>
+                                </p:cTn>
+                              </p:par>
+                            </p:childTnLst>
+                          </p:cTn>
+                        </p:par>
+                      </p:childTnLst>
+                    </p:cTn>
+                  </p:par>
+                  <p:par>
+                    <p:cTn id="19" fill="hold">
+                      <p:stCondLst>
+                        <p:cond delay="indefinite"/>
+                      </p:stCondLst>
+                      <p:childTnLst>
+                        <p:par>
+                          <p:cTn id="20" fill="hold">
+                            <p:stCondLst>
+                              <p:cond delay="0"/>
+                            </p:stCondLst>
+                            <p:childTnLst>
+                              <p:par>
+                                <p:cTn id="21" presetID="1" presetClass="entr" presetSubtype="0" fill="hold" nodeType="clickEffect">
+                                  <p:stCondLst>
+                                    <p:cond delay="0"/>
+                                  </p:stCondLst>
+                                  <p:childTnLst>
+                                    <p:set>
+                                      <p:cBhvr>
+                                        <p:cTn id="22" dur="1" fill="hold">
+                                          <p:stCondLst>
+                                            <p:cond delay="0"/>
+                                          </p:stCondLst>
+                                        </p:cTn>
+                                        <p:tgtEl>
+                                          <p:spTgt spid="2">
+                                            <p:txEl>
+                                              <p:pRg st="4" end="4"/>
+                                            </p:txEl>
+                                          </p:spTgt>
+                                        </p:tgtEl>
+                                        <p:attrNameLst>
+                                          <p:attrName>style.visibility</p:attrName>
+                                        </p:attrNameLst>
+                                      </p:cBhvr>
+                                      <p:to>
+                                        <p:strVal val="visible"/>
+                                      </p:to>
+                                    </p:set>
+                                  </p:childTnLst>
+                                </p:cTn>
+                              </p:par>
+                            </p:childTnLst>
+                          </p:cTn>
+                        </p:par>
+                      </p:childTnLst>
+                    </p:cTn>
+                  </p:par>
+                </p:childTnLst>
+              </p:cTn>
+              <p:prevCondLst>
+                <p:cond evt="onPrev" delay="0">
+                  <p:tgtEl>
+                    <p:sldTgt/>
+                  </p:tgtEl>
+                </p:cond>
+              </p:prevCondLst>
+              <p:nextCondLst>
+                <p:cond evt="onNext" delay="0">
+                  <p:tgtEl>
+                    <p:sldTgt/>
+                  </p:tgtEl>
+                </p:cond>
+              </p:nextCondLst>
+            </p:seq>
+          </p:childTnLst>
+        </p:cTn>
+      </p:par>
+    </p:tnLst>
+  </p:timing>
 </p:sld>
 </file>
 
@@ -26025,7 +26784,7 @@
         </p:nvSpPr>
         <p:spPr>
           <a:xfrm>
-            <a:off x="626525" y="4828248"/>
+            <a:off x="630257" y="4828248"/>
             <a:ext cx="7726500" cy="240000"/>
           </a:xfrm>
           <a:prstGeom prst="rect">
@@ -26055,11 +26814,7 @@
               <a:buSzPts val="405"/>
               <a:buNone/>
             </a:pPr>
-            <a:r>
-              <a:rPr lang="de-DE" sz="1050"/>
-              <a:t>References</a:t>
-            </a:r>
-            <a:endParaRPr sz="1050"/>
+            <a:endParaRPr sz="1050" dirty="0"/>
           </a:p>
           <a:p>
             <a:pPr marL="0" lvl="0" indent="0" algn="l" rtl="0">
@@ -26075,7 +26830,7 @@
               <a:buSzPts val="405"/>
               <a:buNone/>
             </a:pPr>
-            <a:endParaRPr sz="1050"/>
+            <a:endParaRPr sz="1050" dirty="0"/>
           </a:p>
         </p:txBody>
       </p:sp>
@@ -31034,7 +31789,7 @@
         <p:fade/>
       </p:transition>
     </mc:Choice>
-    <mc:Fallback xmlns="" xmlns:mv="urn:schemas-microsoft-com:mac:vml" xmlns:c="http://schemas.openxmlformats.org/drawingml/2006/chart" xmlns:dgm="http://schemas.openxmlformats.org/drawingml/2006/diagram" xmlns:o="urn:schemas-microsoft-com:office:office" xmlns:v="urn:schemas-microsoft-com:vml" xmlns:pvml="urn:schemas-microsoft-com:office:powerpoint" xmlns:com="http://schemas.openxmlformats.org/drawingml/2006/compatibility" xmlns:p15="http://schemas.microsoft.com/office/powerpoint/2012/main" xmlns:ahyp="http://schemas.microsoft.com/office/drawing/2018/hyperlinkcolor">
+    <mc:Fallback xmlns:ahyp="http://schemas.microsoft.com/office/drawing/2018/hyperlinkcolor" xmlns:p15="http://schemas.microsoft.com/office/powerpoint/2012/main" xmlns:com="http://schemas.openxmlformats.org/drawingml/2006/compatibility" xmlns:pvml="urn:schemas-microsoft-com:office:powerpoint" xmlns:v="urn:schemas-microsoft-com:vml" xmlns:o="urn:schemas-microsoft-com:office:office" xmlns:dgm="http://schemas.openxmlformats.org/drawingml/2006/diagram" xmlns:c="http://schemas.openxmlformats.org/drawingml/2006/chart" xmlns:mv="urn:schemas-microsoft-com:mac:vml" xmlns="">
       <p:transition spd="slow">
         <p:fade/>
       </p:transition>

</xml_diff>